<commit_message>
Adds pico container and DI
</commit_message>
<xml_diff>
--- a/slides/Selenium, sesion 5.pptx
+++ b/slides/Selenium, sesion 5.pptx
@@ -49150,7 +49150,7 @@
         </p:nvGrpSpPr>
         <p:grpSpPr>
           <a:xfrm>
-            <a:off x="1481816" y="1653233"/>
+            <a:off x="1481816" y="1662469"/>
             <a:ext cx="7132124" cy="2897579"/>
             <a:chOff x="732029" y="132"/>
             <a:chExt cx="7132124" cy="2897579"/>
@@ -50734,7 +50734,7 @@
               <a:buChar char="▶"/>
             </a:pPr>
             <a:r>
-              <a:rPr lang="es-ES" sz="2800" b="0" i="0" u="none" strike="noStrike" cap="none">
+              <a:rPr lang="es-ES" sz="2800" b="0" i="0" u="none" strike="noStrike" cap="none" dirty="0">
                 <a:solidFill>
                   <a:srgbClr val="3F3F3F"/>
                 </a:solidFill>
@@ -50765,7 +50765,7 @@
               <a:buChar char="▶"/>
             </a:pPr>
             <a:r>
-              <a:rPr lang="es-ES" sz="2800" b="0" i="0" u="none" strike="noStrike" cap="none">
+              <a:rPr lang="es-ES" sz="2800" b="0" i="0" u="none" strike="noStrike" cap="none" dirty="0">
                 <a:solidFill>
                   <a:srgbClr val="3F3F3F"/>
                 </a:solidFill>
@@ -50774,11 +50774,51 @@
                 <a:cs typeface="Trebuchet MS"/>
                 <a:sym typeface="Trebuchet MS"/>
               </a:rPr>
-              <a:t>Los miembros de la clase son los WebElements de la página.</a:t>
+              <a:t>Los miembros de la clase son los </a:t>
             </a:r>
             <a:r>
-              <a:rPr lang="es-ES" sz="2800"/>
-              <a:t>Cada Página o sección de la misma se implementa como una clase</a:t>
+              <a:rPr lang="es-ES" sz="2800" b="0" i="0" u="none" strike="noStrike" cap="none" dirty="0" err="1">
+                <a:solidFill>
+                  <a:srgbClr val="3F3F3F"/>
+                </a:solidFill>
+                <a:latin typeface="Trebuchet MS"/>
+                <a:ea typeface="Trebuchet MS"/>
+                <a:cs typeface="Trebuchet MS"/>
+                <a:sym typeface="Trebuchet MS"/>
+              </a:rPr>
+              <a:t>WebElements</a:t>
+            </a:r>
+            <a:r>
+              <a:rPr lang="es-ES" sz="2800" b="0" i="0" u="none" strike="noStrike" cap="none" dirty="0">
+                <a:solidFill>
+                  <a:srgbClr val="3F3F3F"/>
+                </a:solidFill>
+                <a:latin typeface="Trebuchet MS"/>
+                <a:ea typeface="Trebuchet MS"/>
+                <a:cs typeface="Trebuchet MS"/>
+                <a:sym typeface="Trebuchet MS"/>
+              </a:rPr>
+              <a:t> de la </a:t>
+            </a:r>
+            <a:r>
+              <a:rPr lang="es-ES" sz="2800" b="0" i="0" u="none" strike="noStrike" cap="none" dirty="0" err="1">
+                <a:solidFill>
+                  <a:srgbClr val="3F3F3F"/>
+                </a:solidFill>
+                <a:latin typeface="Trebuchet MS"/>
+                <a:ea typeface="Trebuchet MS"/>
+                <a:cs typeface="Trebuchet MS"/>
+                <a:sym typeface="Trebuchet MS"/>
+              </a:rPr>
+              <a:t>página.</a:t>
+            </a:r>
+            <a:r>
+              <a:rPr lang="es-ES" sz="2800" dirty="0" err="1"/>
+              <a:t>Cada</a:t>
+            </a:r>
+            <a:r>
+              <a:rPr lang="es-ES" sz="2800" dirty="0"/>
+              <a:t> Página o sección de la misma se implementa como una clase</a:t>
             </a:r>
           </a:p>
           <a:p>
@@ -50799,7 +50839,7 @@
               <a:buFont typeface="Noto Sans Symbols"/>
               <a:buChar char="▶"/>
             </a:pPr>
-            <a:endParaRPr sz="2800"/>
+            <a:endParaRPr sz="2800" dirty="0"/>
           </a:p>
           <a:p>
             <a:pPr marL="457200" marR="0" lvl="0" indent="-406400" algn="l" rtl="0">
@@ -50820,7 +50860,7 @@
               <a:buChar char="▶"/>
             </a:pPr>
             <a:r>
-              <a:rPr lang="es-ES" sz="2800" b="0" i="0" u="none" strike="noStrike" cap="none">
+              <a:rPr lang="es-ES" sz="2800" b="0" i="0" u="none" strike="noStrike" cap="none" dirty="0">
                 <a:solidFill>
                   <a:srgbClr val="3F3F3F"/>
                 </a:solidFill>
@@ -50851,7 +50891,7 @@
               <a:buChar char="▶"/>
             </a:pPr>
             <a:r>
-              <a:rPr lang="es-ES" sz="2800" b="0" i="0" u="none" strike="noStrike" cap="none">
+              <a:rPr lang="es-ES" sz="2800" b="0" i="0" u="none" strike="noStrike" cap="none" dirty="0">
                 <a:solidFill>
                   <a:srgbClr val="3F3F3F"/>
                 </a:solidFill>
@@ -50881,7 +50921,7 @@
               <a:buFont typeface="Noto Sans Symbols"/>
               <a:buNone/>
             </a:pPr>
-            <a:endParaRPr sz="1800" b="0" i="0" u="none" strike="noStrike" cap="none">
+            <a:endParaRPr sz="1800" b="0" i="0" u="none" strike="noStrike" cap="none" dirty="0">
               <a:solidFill>
                 <a:srgbClr val="3F3F3F"/>
               </a:solidFill>

</xml_diff>